<commit_message>
Add other prepeared apps and files for the course
</commit_message>
<xml_diff>
--- a/1-dom-manipulation/VueJS Basics Course - Part 1 DOM Manipulation.pptx
+++ b/1-dom-manipulation/VueJS Basics Course - Part 1 DOM Manipulation.pptx
@@ -3038,7 +3038,7 @@
         <p:spPr>
           <a:xfrm>
             <a:off x="950975" y="373075"/>
-            <a:ext cx="9429293" cy="7478970"/>
+            <a:ext cx="9429293" cy="6740307"/>
           </a:xfrm>
           <a:prstGeom prst="rect">
             <a:avLst/>
@@ -3052,7 +3052,7 @@
           <a:lstStyle/>
           <a:p>
             <a:r>
-              <a:rPr lang="en-US" sz="4000" dirty="0"/>
+              <a:rPr lang="en-US" sz="3200" dirty="0"/>
               <a:t>Install following software: </a:t>
             </a:r>
           </a:p>
@@ -3061,100 +3061,125 @@
               <a:buAutoNum type="arabicPeriod"/>
             </a:pPr>
             <a:r>
-              <a:rPr lang="en-US" sz="4000" dirty="0"/>
+              <a:rPr lang="en-US" sz="3200" dirty="0"/>
               <a:t>Chrome browser - </a:t>
             </a:r>
             <a:r>
-              <a:rPr lang="en-US" sz="4000" dirty="0">
+              <a:rPr lang="en-US" sz="3200" dirty="0">
                 <a:hlinkClick r:id="rId2"/>
               </a:rPr>
-              <a:t>https://www.google.com/chrome/</a:t>
-            </a:r>
-            <a:endParaRPr lang="en-US" sz="4000" dirty="0"/>
+              <a:t>www.google.com/chrome/</a:t>
+            </a:r>
+            <a:endParaRPr lang="en-US" sz="3200" dirty="0"/>
           </a:p>
           <a:p>
             <a:pPr marL="342900" indent="-342900">
               <a:buAutoNum type="arabicPeriod"/>
             </a:pPr>
             <a:r>
-              <a:rPr lang="en-US" sz="4000" dirty="0"/>
+              <a:rPr lang="en-US" sz="3200" dirty="0"/>
               <a:t>Node.js - </a:t>
             </a:r>
             <a:r>
-              <a:rPr lang="en-US" sz="4000" dirty="0">
+              <a:rPr lang="en-US" sz="3200" dirty="0">
                 <a:hlinkClick r:id="rId3"/>
               </a:rPr>
-              <a:t>https://nodejs.org</a:t>
-            </a:r>
-            <a:endParaRPr lang="en-US" sz="4000" dirty="0"/>
+              <a:t>nodejs.org</a:t>
+            </a:r>
+            <a:endParaRPr lang="en-US" sz="3200" dirty="0"/>
           </a:p>
           <a:p>
             <a:pPr marL="342900" indent="-342900">
               <a:buAutoNum type="arabicPeriod"/>
             </a:pPr>
             <a:r>
-              <a:rPr lang="en-US" sz="4000" dirty="0"/>
+              <a:rPr lang="en-US" sz="3200" dirty="0"/>
               <a:t>Git Bash - </a:t>
             </a:r>
             <a:r>
-              <a:rPr lang="en-US" sz="4000" dirty="0">
+              <a:rPr lang="en-US" sz="3200" dirty="0">
                 <a:hlinkClick r:id="rId4"/>
               </a:rPr>
-              <a:t>https://git-scm.com/downloads</a:t>
-            </a:r>
-            <a:endParaRPr lang="en-US" sz="4000" dirty="0"/>
+              <a:t>git-scm.com/downloads</a:t>
+            </a:r>
+            <a:endParaRPr lang="en-US" sz="3200" dirty="0"/>
           </a:p>
           <a:p>
             <a:pPr marL="342900" indent="-342900">
               <a:buAutoNum type="arabicPeriod"/>
             </a:pPr>
             <a:r>
-              <a:rPr lang="en-US" sz="4000" dirty="0"/>
+              <a:rPr lang="en-US" sz="3200" dirty="0"/>
               <a:t>VS Code - </a:t>
             </a:r>
             <a:r>
-              <a:rPr lang="en-US" sz="4000" dirty="0">
+              <a:rPr lang="en-US" sz="3200" dirty="0">
                 <a:hlinkClick r:id="rId5"/>
               </a:rPr>
-              <a:t>https://code.visualstudio.com/</a:t>
-            </a:r>
-            <a:endParaRPr lang="en-US" sz="4000" dirty="0"/>
+              <a:t>code.visualstudio.com/</a:t>
+            </a:r>
+            <a:endParaRPr lang="en-US" sz="3200" dirty="0"/>
           </a:p>
           <a:p>
             <a:pPr marL="342900" indent="-342900">
               <a:buAutoNum type="arabicPeriod"/>
             </a:pPr>
             <a:r>
-              <a:rPr lang="en-US" sz="4000" dirty="0"/>
+              <a:rPr lang="en-US" sz="3200" dirty="0"/>
               <a:t>Install http-server:</a:t>
             </a:r>
           </a:p>
           <a:p>
             <a:r>
-              <a:rPr lang="en-US" sz="4000" dirty="0" err="1"/>
+              <a:rPr lang="en-US" sz="3200" dirty="0" err="1"/>
               <a:t>npm</a:t>
             </a:r>
             <a:r>
-              <a:rPr lang="en-US" sz="4000" dirty="0"/>
+              <a:rPr lang="en-US" sz="3200" dirty="0"/>
               <a:t> install –g http-server</a:t>
             </a:r>
           </a:p>
           <a:p>
             <a:r>
-              <a:rPr lang="en-US" sz="4000" dirty="0"/>
-              <a:t>6. </a:t>
-            </a:r>
-            <a:r>
-              <a:rPr lang="en-US" sz="4000"/>
-              <a:t>Download repo: </a:t>
-            </a:r>
-            <a:r>
-              <a:rPr lang="en-US" sz="4000">
+              <a:rPr lang="en-US" sz="3200" dirty="0"/>
+              <a:t>6. Download repo: </a:t>
+            </a:r>
+            <a:r>
+              <a:rPr lang="en-US" sz="3200" dirty="0">
                 <a:hlinkClick r:id="rId6"/>
               </a:rPr>
-              <a:t>https://github.com/boris-nekezov/vuejs-basics-course</a:t>
-            </a:r>
-            <a:endParaRPr lang="en-US" sz="4000"/>
+              <a:t>github.com/boris-nekezov/</a:t>
+            </a:r>
+            <a:r>
+              <a:rPr lang="en-US" sz="3200" dirty="0" err="1">
+                <a:hlinkClick r:id="rId6"/>
+              </a:rPr>
+              <a:t>vuejs</a:t>
+            </a:r>
+            <a:r>
+              <a:rPr lang="en-US" sz="3200" dirty="0">
+                <a:hlinkClick r:id="rId6"/>
+              </a:rPr>
+              <a:t>-basics-course</a:t>
+            </a:r>
+            <a:endParaRPr lang="en-US" sz="3200" dirty="0"/>
+          </a:p>
+          <a:p>
+            <a:r>
+              <a:rPr lang="en-US" sz="3200" dirty="0"/>
+              <a:t>7. Vue.js </a:t>
+            </a:r>
+            <a:r>
+              <a:rPr lang="en-US" sz="3200" dirty="0" err="1"/>
+              <a:t>devtools</a:t>
+            </a:r>
+            <a:r>
+              <a:rPr lang="en-US" sz="3200" dirty="0"/>
+              <a:t> Chrome extension</a:t>
+            </a:r>
+          </a:p>
+          <a:p>
+            <a:endParaRPr lang="en-US" sz="3200" dirty="0"/>
           </a:p>
           <a:p>
             <a:endParaRPr lang="en-US" sz="4000" dirty="0"/>

</xml_diff>